<commit_message>
Finished up to lab 8
</commit_message>
<xml_diff>
--- a/data8/slides/lab5.pptx
+++ b/data8/slides/lab5.pptx
@@ -9,14 +9,21 @@
     <p:sldMasterId id="2147483699" r:id="rId5"/>
   </p:sldMasterIdLst>
   <p:notesMasterIdLst>
-    <p:notesMasterId r:id="rId8"/>
+    <p:notesMasterId r:id="rId15"/>
   </p:notesMasterIdLst>
   <p:handoutMasterIdLst>
-    <p:handoutMasterId r:id="rId9"/>
+    <p:handoutMasterId r:id="rId16"/>
   </p:handoutMasterIdLst>
   <p:sldIdLst>
     <p:sldId id="256" r:id="rId6"/>
-    <p:sldId id="267" r:id="rId7"/>
+    <p:sldId id="289" r:id="rId7"/>
+    <p:sldId id="287" r:id="rId8"/>
+    <p:sldId id="295" r:id="rId9"/>
+    <p:sldId id="296" r:id="rId10"/>
+    <p:sldId id="297" r:id="rId11"/>
+    <p:sldId id="298" r:id="rId12"/>
+    <p:sldId id="267" r:id="rId13"/>
+    <p:sldId id="266" r:id="rId14"/>
   </p:sldIdLst>
   <p:sldSz cx="9144000" cy="6858000" type="screen4x3"/>
   <p:notesSz cx="6858000" cy="9144000"/>
@@ -7650,10 +7657,19 @@
                 </a:solidFill>
                 <a:latin typeface="Avenir LT Std 45 Book" pitchFamily="34" charset="0"/>
               </a:rPr>
-              <a:t>Data 8, Lab </a:t>
-            </a:r>
-            <a:r>
-              <a:rPr lang="en-US" dirty="0" smtClean="0">
+              <a:t>Data 8, </a:t>
+            </a:r>
+            <a:r>
+              <a:rPr lang="en-US" smtClean="0">
+                <a:solidFill>
+                  <a:srgbClr val="C28220"/>
+                </a:solidFill>
+                <a:latin typeface="Avenir LT Std 45 Book" pitchFamily="34" charset="0"/>
+              </a:rPr>
+              <a:t>Lab </a:t>
+            </a:r>
+            <a:r>
+              <a:rPr lang="en-US" smtClean="0">
                 <a:solidFill>
                   <a:srgbClr val="C28220"/>
                 </a:solidFill>
@@ -7696,11 +7712,8 @@
               <a:rPr lang="en-US" b="1" dirty="0" smtClean="0">
                 <a:latin typeface="Avenir LT Std 45 Book" pitchFamily="34" charset="0"/>
               </a:rPr>
-              <a:t>Project 1</a:t>
-            </a:r>
-            <a:endParaRPr lang="en-US" b="1" dirty="0" smtClean="0">
-              <a:latin typeface="Avenir LT Std 45 Book" pitchFamily="34" charset="0"/>
-            </a:endParaRPr>
+              <a:t>Probability and Sampling</a:t>
+            </a:r>
           </a:p>
           <a:p>
             <a:endParaRPr lang="en-US" b="1" dirty="0">
@@ -7712,13 +7725,7 @@
               <a:rPr lang="en-US" b="1" dirty="0" smtClean="0">
                 <a:latin typeface="Avenir LT Std 45 Book" pitchFamily="34" charset="0"/>
               </a:rPr>
-              <a:t>Hubert </a:t>
-            </a:r>
-            <a:r>
-              <a:rPr lang="en-US" b="1" dirty="0" smtClean="0">
-                <a:latin typeface="Avenir LT Std 45 Book" pitchFamily="34" charset="0"/>
-              </a:rPr>
-              <a:t>Luo</a:t>
+              <a:t>Hubert Luo</a:t>
             </a:r>
           </a:p>
           <a:p>
@@ -7739,13 +7746,7 @@
               <a:rPr lang="en-US" dirty="0" smtClean="0">
                 <a:latin typeface="Avenir LT Std 45 Book" pitchFamily="34" charset="0"/>
               </a:rPr>
-              <a:t>27 </a:t>
-            </a:r>
-            <a:r>
-              <a:rPr lang="en-US" dirty="0" smtClean="0">
-                <a:latin typeface="Avenir LT Std 45 Book" pitchFamily="34" charset="0"/>
-              </a:rPr>
-              <a:t>September 2019</a:t>
+              <a:t>4 October 2019</a:t>
             </a:r>
             <a:endParaRPr lang="en-US" dirty="0">
               <a:latin typeface="Avenir LT Std 45 Book" pitchFamily="34" charset="0"/>
@@ -7814,7 +7815,7 @@
               <a:rPr lang="en-CA" dirty="0" smtClean="0">
                 <a:latin typeface="+mn-lt"/>
               </a:rPr>
-              <a:t>Announcements</a:t>
+              <a:t>Agenda</a:t>
             </a:r>
             <a:endParaRPr lang="en-CA" dirty="0">
               <a:latin typeface="+mn-lt"/>
@@ -7842,6 +7843,1354 @@
           <a:bodyPr/>
           <a:lstStyle/>
           <a:p>
+            <a:pPr marL="457200" indent="-457200">
+              <a:buAutoNum type="arabicPeriod"/>
+            </a:pPr>
+            <a:r>
+              <a:rPr lang="en-CA" dirty="0" smtClean="0">
+                <a:latin typeface="+mn-lt"/>
+              </a:rPr>
+              <a:t>Probability </a:t>
+            </a:r>
+          </a:p>
+          <a:p>
+            <a:pPr marL="457200" indent="-457200">
+              <a:buAutoNum type="arabicPeriod"/>
+            </a:pPr>
+            <a:r>
+              <a:rPr lang="en-CA" dirty="0" smtClean="0">
+                <a:latin typeface="+mn-lt"/>
+              </a:rPr>
+              <a:t>Sampling</a:t>
+            </a:r>
+          </a:p>
+          <a:p>
+            <a:pPr marL="457200" indent="-457200">
+              <a:buAutoNum type="arabicPeriod"/>
+            </a:pPr>
+            <a:endParaRPr lang="en-CA" dirty="0" smtClean="0">
+              <a:latin typeface="+mn-lt"/>
+            </a:endParaRPr>
+          </a:p>
+          <a:p>
+            <a:pPr marL="457200" indent="-457200">
+              <a:buAutoNum type="arabicPeriod"/>
+            </a:pPr>
+            <a:endParaRPr lang="en-CA" dirty="0" smtClean="0">
+              <a:latin typeface="+mn-lt"/>
+            </a:endParaRPr>
+          </a:p>
+        </p:txBody>
+      </p:sp>
+    </p:spTree>
+    <p:extLst>
+      <p:ext uri="{BB962C8B-B14F-4D97-AF65-F5344CB8AC3E}">
+        <p14:creationId xmlns:p14="http://schemas.microsoft.com/office/powerpoint/2010/main" val="1468042102"/>
+      </p:ext>
+    </p:extLst>
+  </p:cSld>
+  <p:clrMapOvr>
+    <a:masterClrMapping/>
+  </p:clrMapOvr>
+  <p:timing>
+    <p:tnLst>
+      <p:par>
+        <p:cTn id="1" dur="indefinite" restart="never" nodeType="tmRoot"/>
+      </p:par>
+    </p:tnLst>
+  </p:timing>
+</p:sld>
+</file>
+
+<file path=ppt/slides/slide3.xml><?xml version="1.0" encoding="utf-8"?>
+<p:sld xmlns:a="http://schemas.openxmlformats.org/drawingml/2006/main" xmlns:r="http://schemas.openxmlformats.org/officeDocument/2006/relationships" xmlns:p="http://schemas.openxmlformats.org/presentationml/2006/main">
+  <p:cSld>
+    <p:spTree>
+      <p:nvGrpSpPr>
+        <p:cNvPr id="1" name=""/>
+        <p:cNvGrpSpPr/>
+        <p:nvPr/>
+      </p:nvGrpSpPr>
+      <p:grpSpPr>
+        <a:xfrm>
+          <a:off x="0" y="0"/>
+          <a:ext cx="0" cy="0"/>
+          <a:chOff x="0" y="0"/>
+          <a:chExt cx="0" cy="0"/>
+        </a:xfrm>
+      </p:grpSpPr>
+      <p:sp>
+        <p:nvSpPr>
+          <p:cNvPr id="2" name="Title 1"/>
+          <p:cNvSpPr>
+            <a:spLocks noGrp="1"/>
+          </p:cNvSpPr>
+          <p:nvPr>
+            <p:ph type="title"/>
+          </p:nvPr>
+        </p:nvSpPr>
+        <p:spPr>
+          <a:xfrm>
+            <a:off x="457200" y="449932"/>
+            <a:ext cx="8286750" cy="1150353"/>
+          </a:xfrm>
+        </p:spPr>
+        <p:txBody>
+          <a:bodyPr/>
+          <a:lstStyle/>
+          <a:p>
+            <a:r>
+              <a:rPr lang="en-CA" dirty="0" smtClean="0">
+                <a:latin typeface="+mn-lt"/>
+              </a:rPr>
+              <a:t>Probability Review</a:t>
+            </a:r>
+            <a:endParaRPr lang="en-CA" dirty="0">
+              <a:latin typeface="+mn-lt"/>
+            </a:endParaRPr>
+          </a:p>
+        </p:txBody>
+      </p:sp>
+      <p:sp>
+        <p:nvSpPr>
+          <p:cNvPr id="3" name="Content Placeholder 2"/>
+          <p:cNvSpPr>
+            <a:spLocks noGrp="1"/>
+          </p:cNvSpPr>
+          <p:nvPr>
+            <p:ph idx="1"/>
+          </p:nvPr>
+        </p:nvSpPr>
+        <p:spPr>
+          <a:xfrm>
+            <a:off x="457200" y="1756947"/>
+            <a:ext cx="8286750" cy="3596103"/>
+          </a:xfrm>
+        </p:spPr>
+        <p:txBody>
+          <a:bodyPr/>
+          <a:lstStyle/>
+          <a:p>
+            <a:r>
+              <a:rPr lang="en-CA" dirty="0" smtClean="0">
+                <a:latin typeface="+mn-lt"/>
+              </a:rPr>
+              <a:t>Probability is a number between 0 and 1 (inclusive)</a:t>
+            </a:r>
+          </a:p>
+          <a:p>
+            <a:r>
+              <a:rPr lang="en-CA" dirty="0" smtClean="0">
+                <a:latin typeface="+mn-lt"/>
+              </a:rPr>
+              <a:t>P(A) = 0.5 means there is a 50% chance of event A happening</a:t>
+            </a:r>
+          </a:p>
+          <a:p>
+            <a:r>
+              <a:rPr lang="en-CA" dirty="0" smtClean="0">
+                <a:latin typeface="+mn-lt"/>
+              </a:rPr>
+              <a:t>Calculated by determining what % of all possible outcomes result in A happening</a:t>
+            </a:r>
+          </a:p>
+          <a:p>
+            <a:r>
+              <a:rPr lang="en-CA" dirty="0" smtClean="0">
+                <a:latin typeface="+mn-lt"/>
+              </a:rPr>
+              <a:t>Complement: P(A doesn’t happen) = 1-P(A)</a:t>
+            </a:r>
+          </a:p>
+          <a:p>
+            <a:r>
+              <a:rPr lang="en-CA" dirty="0" smtClean="0">
+                <a:latin typeface="+mn-lt"/>
+              </a:rPr>
+              <a:t>Multiplicative Rule: Probability that events A and B happen is P(A happens) x P(B happens given that A has happened)</a:t>
+            </a:r>
+          </a:p>
+          <a:p>
+            <a:r>
+              <a:rPr lang="en-CA" dirty="0" smtClean="0">
+                <a:latin typeface="+mn-lt"/>
+              </a:rPr>
+              <a:t>Additive Rule: If event A can happen in two ways, then P(A happens) = P(first way) + P(second way)</a:t>
+            </a:r>
+          </a:p>
+          <a:p>
+            <a:pPr marL="0" indent="0">
+              <a:buNone/>
+            </a:pPr>
+            <a:endParaRPr lang="en-CA" dirty="0" smtClean="0">
+              <a:latin typeface="+mn-lt"/>
+            </a:endParaRPr>
+          </a:p>
+        </p:txBody>
+      </p:sp>
+    </p:spTree>
+    <p:extLst>
+      <p:ext uri="{BB962C8B-B14F-4D97-AF65-F5344CB8AC3E}">
+        <p14:creationId xmlns:p14="http://schemas.microsoft.com/office/powerpoint/2010/main" val="3385360168"/>
+      </p:ext>
+    </p:extLst>
+  </p:cSld>
+  <p:clrMapOvr>
+    <a:masterClrMapping/>
+  </p:clrMapOvr>
+  <p:timing>
+    <p:tnLst>
+      <p:par>
+        <p:cTn id="1" dur="indefinite" restart="never" nodeType="tmRoot"/>
+      </p:par>
+    </p:tnLst>
+  </p:timing>
+</p:sld>
+</file>
+
+<file path=ppt/slides/slide4.xml><?xml version="1.0" encoding="utf-8"?>
+<p:sld xmlns:a="http://schemas.openxmlformats.org/drawingml/2006/main" xmlns:r="http://schemas.openxmlformats.org/officeDocument/2006/relationships" xmlns:p="http://schemas.openxmlformats.org/presentationml/2006/main">
+  <p:cSld>
+    <p:spTree>
+      <p:nvGrpSpPr>
+        <p:cNvPr id="1" name=""/>
+        <p:cNvGrpSpPr/>
+        <p:nvPr/>
+      </p:nvGrpSpPr>
+      <p:grpSpPr>
+        <a:xfrm>
+          <a:off x="0" y="0"/>
+          <a:ext cx="0" cy="0"/>
+          <a:chOff x="0" y="0"/>
+          <a:chExt cx="0" cy="0"/>
+        </a:xfrm>
+      </p:grpSpPr>
+      <p:sp>
+        <p:nvSpPr>
+          <p:cNvPr id="2" name="Title 1"/>
+          <p:cNvSpPr>
+            <a:spLocks noGrp="1"/>
+          </p:cNvSpPr>
+          <p:nvPr>
+            <p:ph type="title"/>
+          </p:nvPr>
+        </p:nvSpPr>
+        <p:spPr>
+          <a:xfrm>
+            <a:off x="457200" y="449932"/>
+            <a:ext cx="8286750" cy="1150353"/>
+          </a:xfrm>
+        </p:spPr>
+        <p:txBody>
+          <a:bodyPr/>
+          <a:lstStyle/>
+          <a:p>
+            <a:r>
+              <a:rPr lang="en-CA" dirty="0" smtClean="0">
+                <a:latin typeface="+mn-lt"/>
+              </a:rPr>
+              <a:t>Probability Questions</a:t>
+            </a:r>
+            <a:endParaRPr lang="en-CA" dirty="0">
+              <a:latin typeface="+mn-lt"/>
+            </a:endParaRPr>
+          </a:p>
+        </p:txBody>
+      </p:sp>
+      <p:sp>
+        <p:nvSpPr>
+          <p:cNvPr id="3" name="Content Placeholder 2"/>
+          <p:cNvSpPr>
+            <a:spLocks noGrp="1"/>
+          </p:cNvSpPr>
+          <p:nvPr>
+            <p:ph idx="1"/>
+          </p:nvPr>
+        </p:nvSpPr>
+        <p:spPr>
+          <a:xfrm>
+            <a:off x="457200" y="1756947"/>
+            <a:ext cx="8286750" cy="3967578"/>
+          </a:xfrm>
+        </p:spPr>
+        <p:txBody>
+          <a:bodyPr>
+            <a:normAutofit/>
+          </a:bodyPr>
+          <a:lstStyle/>
+          <a:p>
+            <a:pPr marL="0" indent="0">
+              <a:buNone/>
+            </a:pPr>
+            <a:r>
+              <a:rPr lang="en-CA" dirty="0" smtClean="0">
+                <a:latin typeface="+mn-lt"/>
+              </a:rPr>
+              <a:t>A standard deck of cards is 52 cards, 13 of each suite. None of the questions depend on the previous question. All draws are without replacement. Keep all solutions as fractions!!</a:t>
+            </a:r>
+          </a:p>
+          <a:p>
+            <a:pPr marL="0" indent="0">
+              <a:buNone/>
+            </a:pPr>
+            <a:endParaRPr lang="en-CA" dirty="0" smtClean="0">
+              <a:latin typeface="+mn-lt"/>
+            </a:endParaRPr>
+          </a:p>
+          <a:p>
+            <a:pPr marL="457200" indent="-457200">
+              <a:buAutoNum type="arabicPeriod"/>
+            </a:pPr>
+            <a:r>
+              <a:rPr lang="en-CA" dirty="0" smtClean="0">
+                <a:latin typeface="+mn-lt"/>
+              </a:rPr>
+              <a:t>What is the probability of drawing an ace?</a:t>
+            </a:r>
+          </a:p>
+          <a:p>
+            <a:pPr marL="457200" indent="-457200">
+              <a:buAutoNum type="arabicPeriod"/>
+            </a:pPr>
+            <a:r>
+              <a:rPr lang="en-CA" dirty="0" smtClean="0">
+                <a:latin typeface="+mn-lt"/>
+              </a:rPr>
+              <a:t>What is the probability of drawing two queens in a row? </a:t>
+            </a:r>
+          </a:p>
+          <a:p>
+            <a:pPr marL="457200" indent="-457200">
+              <a:buAutoNum type="arabicPeriod"/>
+            </a:pPr>
+            <a:r>
+              <a:rPr lang="en-CA" dirty="0" smtClean="0">
+                <a:latin typeface="+mn-lt"/>
+              </a:rPr>
+              <a:t>What is the probability of getting both a king and a queen after two draws?</a:t>
+            </a:r>
+          </a:p>
+          <a:p>
+            <a:pPr marL="457200" indent="-457200">
+              <a:buAutoNum type="arabicPeriod"/>
+            </a:pPr>
+            <a:r>
+              <a:rPr lang="en-CA" dirty="0" smtClean="0">
+                <a:latin typeface="+mn-lt"/>
+              </a:rPr>
+              <a:t>What is the probability of getting at least one ace when dealt 5 cards?</a:t>
+            </a:r>
+          </a:p>
+        </p:txBody>
+      </p:sp>
+    </p:spTree>
+    <p:extLst>
+      <p:ext uri="{BB962C8B-B14F-4D97-AF65-F5344CB8AC3E}">
+        <p14:creationId xmlns:p14="http://schemas.microsoft.com/office/powerpoint/2010/main" val="1305609426"/>
+      </p:ext>
+    </p:extLst>
+  </p:cSld>
+  <p:clrMapOvr>
+    <a:masterClrMapping/>
+  </p:clrMapOvr>
+  <p:timing>
+    <p:tnLst>
+      <p:par>
+        <p:cTn id="1" dur="indefinite" restart="never" nodeType="tmRoot"/>
+      </p:par>
+    </p:tnLst>
+  </p:timing>
+</p:sld>
+</file>
+
+<file path=ppt/slides/slide5.xml><?xml version="1.0" encoding="utf-8"?>
+<p:sld xmlns:a="http://schemas.openxmlformats.org/drawingml/2006/main" xmlns:r="http://schemas.openxmlformats.org/officeDocument/2006/relationships" xmlns:p="http://schemas.openxmlformats.org/presentationml/2006/main">
+  <p:cSld>
+    <p:spTree>
+      <p:nvGrpSpPr>
+        <p:cNvPr id="1" name=""/>
+        <p:cNvGrpSpPr/>
+        <p:nvPr/>
+      </p:nvGrpSpPr>
+      <p:grpSpPr>
+        <a:xfrm>
+          <a:off x="0" y="0"/>
+          <a:ext cx="0" cy="0"/>
+          <a:chOff x="0" y="0"/>
+          <a:chExt cx="0" cy="0"/>
+        </a:xfrm>
+      </p:grpSpPr>
+      <p:sp>
+        <p:nvSpPr>
+          <p:cNvPr id="2" name="Title 1"/>
+          <p:cNvSpPr>
+            <a:spLocks noGrp="1"/>
+          </p:cNvSpPr>
+          <p:nvPr>
+            <p:ph type="title"/>
+          </p:nvPr>
+        </p:nvSpPr>
+        <p:spPr>
+          <a:xfrm>
+            <a:off x="457200" y="449932"/>
+            <a:ext cx="8286750" cy="1150353"/>
+          </a:xfrm>
+        </p:spPr>
+        <p:txBody>
+          <a:bodyPr/>
+          <a:lstStyle/>
+          <a:p>
+            <a:r>
+              <a:rPr lang="en-CA" dirty="0" smtClean="0">
+                <a:latin typeface="+mn-lt"/>
+              </a:rPr>
+              <a:t>Probability Questions: Solutions</a:t>
+            </a:r>
+            <a:endParaRPr lang="en-CA" dirty="0">
+              <a:latin typeface="+mn-lt"/>
+            </a:endParaRPr>
+          </a:p>
+        </p:txBody>
+      </p:sp>
+      <p:sp>
+        <p:nvSpPr>
+          <p:cNvPr id="3" name="Content Placeholder 2"/>
+          <p:cNvSpPr>
+            <a:spLocks noGrp="1"/>
+          </p:cNvSpPr>
+          <p:nvPr>
+            <p:ph idx="1"/>
+          </p:nvPr>
+        </p:nvSpPr>
+        <p:spPr>
+          <a:xfrm>
+            <a:off x="457200" y="1756947"/>
+            <a:ext cx="8286750" cy="3596103"/>
+          </a:xfrm>
+        </p:spPr>
+        <p:txBody>
+          <a:bodyPr>
+            <a:normAutofit/>
+          </a:bodyPr>
+          <a:lstStyle/>
+          <a:p>
+            <a:pPr marL="457200" indent="-457200">
+              <a:buAutoNum type="arabicPeriod"/>
+            </a:pPr>
+            <a:r>
+              <a:rPr lang="en-CA" sz="2000" dirty="0" smtClean="0">
+                <a:latin typeface="+mn-lt"/>
+              </a:rPr>
+              <a:t>What is the probability of drawing an ace?</a:t>
+            </a:r>
+          </a:p>
+          <a:p>
+            <a:pPr marL="400050" lvl="1" indent="0">
+              <a:buNone/>
+            </a:pPr>
+            <a:r>
+              <a:rPr lang="en-CA" dirty="0" smtClean="0">
+                <a:latin typeface="+mn-lt"/>
+              </a:rPr>
+              <a:t>4/52 = 1/13</a:t>
+            </a:r>
+          </a:p>
+          <a:p>
+            <a:pPr marL="457200" indent="-457200">
+              <a:buAutoNum type="arabicPeriod"/>
+            </a:pPr>
+            <a:r>
+              <a:rPr lang="en-CA" sz="2000" dirty="0" smtClean="0">
+                <a:latin typeface="+mn-lt"/>
+              </a:rPr>
+              <a:t>What is the probability of drawing two queens in a row? </a:t>
+            </a:r>
+          </a:p>
+          <a:p>
+            <a:pPr marL="400050" lvl="1" indent="0">
+              <a:buNone/>
+            </a:pPr>
+            <a:r>
+              <a:rPr lang="en-CA" dirty="0" smtClean="0">
+                <a:latin typeface="+mn-lt"/>
+              </a:rPr>
+              <a:t>Multiplicative Rule: 4/52 x 3/51</a:t>
+            </a:r>
+          </a:p>
+          <a:p>
+            <a:pPr marL="457200" indent="-457200">
+              <a:buAutoNum type="arabicPeriod"/>
+            </a:pPr>
+            <a:r>
+              <a:rPr lang="en-CA" sz="2000" dirty="0" smtClean="0">
+                <a:latin typeface="+mn-lt"/>
+              </a:rPr>
+              <a:t>What is the probability of getting both a king and a queen after two draws?</a:t>
+            </a:r>
+          </a:p>
+          <a:p>
+            <a:pPr marL="0" lvl="1" indent="0">
+              <a:buNone/>
+            </a:pPr>
+            <a:r>
+              <a:rPr lang="en-CA" dirty="0" smtClean="0">
+                <a:latin typeface="+mn-lt"/>
+              </a:rPr>
+              <a:t>	Additive </a:t>
+            </a:r>
+            <a:r>
+              <a:rPr lang="en-CA" dirty="0">
+                <a:latin typeface="+mn-lt"/>
+              </a:rPr>
+              <a:t>Rule: 4/52 x 4/51 + 4/52 x </a:t>
+            </a:r>
+            <a:r>
+              <a:rPr lang="en-CA" dirty="0" smtClean="0">
+                <a:latin typeface="+mn-lt"/>
+              </a:rPr>
+              <a:t>4/51</a:t>
+            </a:r>
+          </a:p>
+          <a:p>
+            <a:pPr marL="457200" indent="-457200">
+              <a:buAutoNum type="arabicPeriod"/>
+            </a:pPr>
+            <a:r>
+              <a:rPr lang="en-CA" sz="2000" dirty="0" smtClean="0">
+                <a:latin typeface="+mn-lt"/>
+              </a:rPr>
+              <a:t>What </a:t>
+            </a:r>
+            <a:r>
+              <a:rPr lang="en-CA" sz="2000" dirty="0">
+                <a:latin typeface="+mn-lt"/>
+              </a:rPr>
+              <a:t>is the probability of getting at least one ace when dealt 5 cards?</a:t>
+            </a:r>
+          </a:p>
+          <a:p>
+            <a:pPr marL="400050" lvl="1" indent="0">
+              <a:buNone/>
+            </a:pPr>
+            <a:r>
+              <a:rPr lang="en-CA" dirty="0" smtClean="0">
+                <a:latin typeface="+mn-lt"/>
+              </a:rPr>
+              <a:t>1- P(No Aces) = 1-(48/52 x 47/51 x 46/50 x 45/49 x 44/48)</a:t>
+            </a:r>
+          </a:p>
+        </p:txBody>
+      </p:sp>
+    </p:spTree>
+    <p:extLst>
+      <p:ext uri="{BB962C8B-B14F-4D97-AF65-F5344CB8AC3E}">
+        <p14:creationId xmlns:p14="http://schemas.microsoft.com/office/powerpoint/2010/main" val="1596718611"/>
+      </p:ext>
+    </p:extLst>
+  </p:cSld>
+  <p:clrMapOvr>
+    <a:masterClrMapping/>
+  </p:clrMapOvr>
+  <p:timing>
+    <p:tnLst>
+      <p:par>
+        <p:cTn id="1" dur="indefinite" restart="never" nodeType="tmRoot">
+          <p:childTnLst>
+            <p:seq concurrent="1" nextAc="seek">
+              <p:cTn id="2" dur="indefinite" nodeType="mainSeq">
+                <p:childTnLst>
+                  <p:par>
+                    <p:cTn id="3" fill="hold">
+                      <p:stCondLst>
+                        <p:cond delay="indefinite"/>
+                      </p:stCondLst>
+                      <p:childTnLst>
+                        <p:par>
+                          <p:cTn id="4" fill="hold">
+                            <p:stCondLst>
+                              <p:cond delay="0"/>
+                            </p:stCondLst>
+                            <p:childTnLst>
+                              <p:par>
+                                <p:cTn id="5" presetID="1" presetClass="entr" presetSubtype="0" fill="hold" nodeType="clickEffect">
+                                  <p:stCondLst>
+                                    <p:cond delay="0"/>
+                                  </p:stCondLst>
+                                  <p:childTnLst>
+                                    <p:set>
+                                      <p:cBhvr>
+                                        <p:cTn id="6" dur="1" fill="hold">
+                                          <p:stCondLst>
+                                            <p:cond delay="0"/>
+                                          </p:stCondLst>
+                                        </p:cTn>
+                                        <p:tgtEl>
+                                          <p:spTgt spid="3">
+                                            <p:txEl>
+                                              <p:pRg st="0" end="0"/>
+                                            </p:txEl>
+                                          </p:spTgt>
+                                        </p:tgtEl>
+                                        <p:attrNameLst>
+                                          <p:attrName>style.visibility</p:attrName>
+                                        </p:attrNameLst>
+                                      </p:cBhvr>
+                                      <p:to>
+                                        <p:strVal val="visible"/>
+                                      </p:to>
+                                    </p:set>
+                                  </p:childTnLst>
+                                </p:cTn>
+                              </p:par>
+                            </p:childTnLst>
+                          </p:cTn>
+                        </p:par>
+                      </p:childTnLst>
+                    </p:cTn>
+                  </p:par>
+                  <p:par>
+                    <p:cTn id="7" fill="hold">
+                      <p:stCondLst>
+                        <p:cond delay="indefinite"/>
+                      </p:stCondLst>
+                      <p:childTnLst>
+                        <p:par>
+                          <p:cTn id="8" fill="hold">
+                            <p:stCondLst>
+                              <p:cond delay="0"/>
+                            </p:stCondLst>
+                            <p:childTnLst>
+                              <p:par>
+                                <p:cTn id="9" presetID="1" presetClass="entr" presetSubtype="0" fill="hold" grpId="0" nodeType="clickEffect">
+                                  <p:stCondLst>
+                                    <p:cond delay="0"/>
+                                  </p:stCondLst>
+                                  <p:childTnLst>
+                                    <p:set>
+                                      <p:cBhvr>
+                                        <p:cTn id="10" dur="1" fill="hold">
+                                          <p:stCondLst>
+                                            <p:cond delay="0"/>
+                                          </p:stCondLst>
+                                        </p:cTn>
+                                        <p:tgtEl>
+                                          <p:spTgt spid="3">
+                                            <p:txEl>
+                                              <p:pRg st="0" end="0"/>
+                                            </p:txEl>
+                                          </p:spTgt>
+                                        </p:tgtEl>
+                                        <p:attrNameLst>
+                                          <p:attrName>style.visibility</p:attrName>
+                                        </p:attrNameLst>
+                                      </p:cBhvr>
+                                      <p:to>
+                                        <p:strVal val="visible"/>
+                                      </p:to>
+                                    </p:set>
+                                  </p:childTnLst>
+                                </p:cTn>
+                              </p:par>
+                              <p:par>
+                                <p:cTn id="11" presetID="1" presetClass="entr" presetSubtype="0" fill="hold" grpId="0" nodeType="withEffect">
+                                  <p:stCondLst>
+                                    <p:cond delay="0"/>
+                                  </p:stCondLst>
+                                  <p:childTnLst>
+                                    <p:set>
+                                      <p:cBhvr>
+                                        <p:cTn id="12" dur="1" fill="hold">
+                                          <p:stCondLst>
+                                            <p:cond delay="0"/>
+                                          </p:stCondLst>
+                                        </p:cTn>
+                                        <p:tgtEl>
+                                          <p:spTgt spid="3">
+                                            <p:txEl>
+                                              <p:pRg st="1" end="1"/>
+                                            </p:txEl>
+                                          </p:spTgt>
+                                        </p:tgtEl>
+                                        <p:attrNameLst>
+                                          <p:attrName>style.visibility</p:attrName>
+                                        </p:attrNameLst>
+                                      </p:cBhvr>
+                                      <p:to>
+                                        <p:strVal val="visible"/>
+                                      </p:to>
+                                    </p:set>
+                                  </p:childTnLst>
+                                </p:cTn>
+                              </p:par>
+                            </p:childTnLst>
+                          </p:cTn>
+                        </p:par>
+                      </p:childTnLst>
+                    </p:cTn>
+                  </p:par>
+                  <p:par>
+                    <p:cTn id="13" fill="hold">
+                      <p:stCondLst>
+                        <p:cond delay="indefinite"/>
+                      </p:stCondLst>
+                      <p:childTnLst>
+                        <p:par>
+                          <p:cTn id="14" fill="hold">
+                            <p:stCondLst>
+                              <p:cond delay="0"/>
+                            </p:stCondLst>
+                            <p:childTnLst>
+                              <p:par>
+                                <p:cTn id="15" presetID="1" presetClass="entr" presetSubtype="0" fill="hold" nodeType="clickEffect">
+                                  <p:stCondLst>
+                                    <p:cond delay="0"/>
+                                  </p:stCondLst>
+                                  <p:childTnLst>
+                                    <p:set>
+                                      <p:cBhvr>
+                                        <p:cTn id="16" dur="1" fill="hold">
+                                          <p:stCondLst>
+                                            <p:cond delay="0"/>
+                                          </p:stCondLst>
+                                        </p:cTn>
+                                        <p:tgtEl>
+                                          <p:spTgt spid="3">
+                                            <p:txEl>
+                                              <p:pRg st="2" end="2"/>
+                                            </p:txEl>
+                                          </p:spTgt>
+                                        </p:tgtEl>
+                                        <p:attrNameLst>
+                                          <p:attrName>style.visibility</p:attrName>
+                                        </p:attrNameLst>
+                                      </p:cBhvr>
+                                      <p:to>
+                                        <p:strVal val="visible"/>
+                                      </p:to>
+                                    </p:set>
+                                  </p:childTnLst>
+                                </p:cTn>
+                              </p:par>
+                            </p:childTnLst>
+                          </p:cTn>
+                        </p:par>
+                      </p:childTnLst>
+                    </p:cTn>
+                  </p:par>
+                  <p:par>
+                    <p:cTn id="17" fill="hold">
+                      <p:stCondLst>
+                        <p:cond delay="indefinite"/>
+                      </p:stCondLst>
+                      <p:childTnLst>
+                        <p:par>
+                          <p:cTn id="18" fill="hold">
+                            <p:stCondLst>
+                              <p:cond delay="0"/>
+                            </p:stCondLst>
+                            <p:childTnLst>
+                              <p:par>
+                                <p:cTn id="19" presetID="1" presetClass="entr" presetSubtype="0" fill="hold" nodeType="clickEffect">
+                                  <p:stCondLst>
+                                    <p:cond delay="0"/>
+                                  </p:stCondLst>
+                                  <p:childTnLst>
+                                    <p:set>
+                                      <p:cBhvr>
+                                        <p:cTn id="20" dur="1" fill="hold">
+                                          <p:stCondLst>
+                                            <p:cond delay="0"/>
+                                          </p:stCondLst>
+                                        </p:cTn>
+                                        <p:tgtEl>
+                                          <p:spTgt spid="3">
+                                            <p:txEl>
+                                              <p:pRg st="3" end="3"/>
+                                            </p:txEl>
+                                          </p:spTgt>
+                                        </p:tgtEl>
+                                        <p:attrNameLst>
+                                          <p:attrName>style.visibility</p:attrName>
+                                        </p:attrNameLst>
+                                      </p:cBhvr>
+                                      <p:to>
+                                        <p:strVal val="visible"/>
+                                      </p:to>
+                                    </p:set>
+                                  </p:childTnLst>
+                                </p:cTn>
+                              </p:par>
+                            </p:childTnLst>
+                          </p:cTn>
+                        </p:par>
+                      </p:childTnLst>
+                    </p:cTn>
+                  </p:par>
+                  <p:par>
+                    <p:cTn id="21" fill="hold">
+                      <p:stCondLst>
+                        <p:cond delay="indefinite"/>
+                      </p:stCondLst>
+                      <p:childTnLst>
+                        <p:par>
+                          <p:cTn id="22" fill="hold">
+                            <p:stCondLst>
+                              <p:cond delay="0"/>
+                            </p:stCondLst>
+                            <p:childTnLst>
+                              <p:par>
+                                <p:cTn id="23" presetID="1" presetClass="entr" presetSubtype="0" fill="hold" nodeType="clickEffect">
+                                  <p:stCondLst>
+                                    <p:cond delay="0"/>
+                                  </p:stCondLst>
+                                  <p:childTnLst>
+                                    <p:set>
+                                      <p:cBhvr>
+                                        <p:cTn id="24" dur="1" fill="hold">
+                                          <p:stCondLst>
+                                            <p:cond delay="0"/>
+                                          </p:stCondLst>
+                                        </p:cTn>
+                                        <p:tgtEl>
+                                          <p:spTgt spid="3">
+                                            <p:txEl>
+                                              <p:pRg st="4" end="4"/>
+                                            </p:txEl>
+                                          </p:spTgt>
+                                        </p:tgtEl>
+                                        <p:attrNameLst>
+                                          <p:attrName>style.visibility</p:attrName>
+                                        </p:attrNameLst>
+                                      </p:cBhvr>
+                                      <p:to>
+                                        <p:strVal val="visible"/>
+                                      </p:to>
+                                    </p:set>
+                                  </p:childTnLst>
+                                </p:cTn>
+                              </p:par>
+                            </p:childTnLst>
+                          </p:cTn>
+                        </p:par>
+                      </p:childTnLst>
+                    </p:cTn>
+                  </p:par>
+                  <p:par>
+                    <p:cTn id="25" fill="hold">
+                      <p:stCondLst>
+                        <p:cond delay="indefinite"/>
+                      </p:stCondLst>
+                      <p:childTnLst>
+                        <p:par>
+                          <p:cTn id="26" fill="hold">
+                            <p:stCondLst>
+                              <p:cond delay="0"/>
+                            </p:stCondLst>
+                            <p:childTnLst>
+                              <p:par>
+                                <p:cTn id="27" presetID="1" presetClass="entr" presetSubtype="0" fill="hold" nodeType="clickEffect">
+                                  <p:stCondLst>
+                                    <p:cond delay="0"/>
+                                  </p:stCondLst>
+                                  <p:childTnLst>
+                                    <p:set>
+                                      <p:cBhvr>
+                                        <p:cTn id="28" dur="1" fill="hold">
+                                          <p:stCondLst>
+                                            <p:cond delay="0"/>
+                                          </p:stCondLst>
+                                        </p:cTn>
+                                        <p:tgtEl>
+                                          <p:spTgt spid="3">
+                                            <p:txEl>
+                                              <p:pRg st="5" end="5"/>
+                                            </p:txEl>
+                                          </p:spTgt>
+                                        </p:tgtEl>
+                                        <p:attrNameLst>
+                                          <p:attrName>style.visibility</p:attrName>
+                                        </p:attrNameLst>
+                                      </p:cBhvr>
+                                      <p:to>
+                                        <p:strVal val="visible"/>
+                                      </p:to>
+                                    </p:set>
+                                  </p:childTnLst>
+                                </p:cTn>
+                              </p:par>
+                            </p:childTnLst>
+                          </p:cTn>
+                        </p:par>
+                      </p:childTnLst>
+                    </p:cTn>
+                  </p:par>
+                  <p:par>
+                    <p:cTn id="29" fill="hold">
+                      <p:stCondLst>
+                        <p:cond delay="indefinite"/>
+                      </p:stCondLst>
+                      <p:childTnLst>
+                        <p:par>
+                          <p:cTn id="30" fill="hold">
+                            <p:stCondLst>
+                              <p:cond delay="0"/>
+                            </p:stCondLst>
+                            <p:childTnLst>
+                              <p:par>
+                                <p:cTn id="31" presetID="1" presetClass="entr" presetSubtype="0" fill="hold" nodeType="clickEffect">
+                                  <p:stCondLst>
+                                    <p:cond delay="0"/>
+                                  </p:stCondLst>
+                                  <p:childTnLst>
+                                    <p:set>
+                                      <p:cBhvr>
+                                        <p:cTn id="32" dur="1" fill="hold">
+                                          <p:stCondLst>
+                                            <p:cond delay="0"/>
+                                          </p:stCondLst>
+                                        </p:cTn>
+                                        <p:tgtEl>
+                                          <p:spTgt spid="3">
+                                            <p:txEl>
+                                              <p:pRg st="6" end="6"/>
+                                            </p:txEl>
+                                          </p:spTgt>
+                                        </p:tgtEl>
+                                        <p:attrNameLst>
+                                          <p:attrName>style.visibility</p:attrName>
+                                        </p:attrNameLst>
+                                      </p:cBhvr>
+                                      <p:to>
+                                        <p:strVal val="visible"/>
+                                      </p:to>
+                                    </p:set>
+                                  </p:childTnLst>
+                                </p:cTn>
+                              </p:par>
+                            </p:childTnLst>
+                          </p:cTn>
+                        </p:par>
+                      </p:childTnLst>
+                    </p:cTn>
+                  </p:par>
+                  <p:par>
+                    <p:cTn id="33" fill="hold">
+                      <p:stCondLst>
+                        <p:cond delay="indefinite"/>
+                      </p:stCondLst>
+                      <p:childTnLst>
+                        <p:par>
+                          <p:cTn id="34" fill="hold">
+                            <p:stCondLst>
+                              <p:cond delay="0"/>
+                            </p:stCondLst>
+                            <p:childTnLst>
+                              <p:par>
+                                <p:cTn id="35" presetID="1" presetClass="entr" presetSubtype="0" fill="hold" nodeType="clickEffect">
+                                  <p:stCondLst>
+                                    <p:cond delay="0"/>
+                                  </p:stCondLst>
+                                  <p:childTnLst>
+                                    <p:set>
+                                      <p:cBhvr>
+                                        <p:cTn id="36" dur="1" fill="hold">
+                                          <p:stCondLst>
+                                            <p:cond delay="0"/>
+                                          </p:stCondLst>
+                                        </p:cTn>
+                                        <p:tgtEl>
+                                          <p:spTgt spid="3">
+                                            <p:txEl>
+                                              <p:pRg st="7" end="7"/>
+                                            </p:txEl>
+                                          </p:spTgt>
+                                        </p:tgtEl>
+                                        <p:attrNameLst>
+                                          <p:attrName>style.visibility</p:attrName>
+                                        </p:attrNameLst>
+                                      </p:cBhvr>
+                                      <p:to>
+                                        <p:strVal val="visible"/>
+                                      </p:to>
+                                    </p:set>
+                                  </p:childTnLst>
+                                </p:cTn>
+                              </p:par>
+                            </p:childTnLst>
+                          </p:cTn>
+                        </p:par>
+                      </p:childTnLst>
+                    </p:cTn>
+                  </p:par>
+                </p:childTnLst>
+              </p:cTn>
+              <p:prevCondLst>
+                <p:cond evt="onPrev" delay="0">
+                  <p:tgtEl>
+                    <p:sldTgt/>
+                  </p:tgtEl>
+                </p:cond>
+              </p:prevCondLst>
+              <p:nextCondLst>
+                <p:cond evt="onNext" delay="0">
+                  <p:tgtEl>
+                    <p:sldTgt/>
+                  </p:tgtEl>
+                </p:cond>
+              </p:nextCondLst>
+            </p:seq>
+          </p:childTnLst>
+        </p:cTn>
+      </p:par>
+    </p:tnLst>
+    <p:bldLst>
+      <p:bldP spid="3" grpId="0" uiExpand="1" build="p"/>
+    </p:bldLst>
+  </p:timing>
+</p:sld>
+</file>
+
+<file path=ppt/slides/slide6.xml><?xml version="1.0" encoding="utf-8"?>
+<p:sld xmlns:a="http://schemas.openxmlformats.org/drawingml/2006/main" xmlns:r="http://schemas.openxmlformats.org/officeDocument/2006/relationships" xmlns:p="http://schemas.openxmlformats.org/presentationml/2006/main">
+  <p:cSld>
+    <p:spTree>
+      <p:nvGrpSpPr>
+        <p:cNvPr id="1" name=""/>
+        <p:cNvGrpSpPr/>
+        <p:nvPr/>
+      </p:nvGrpSpPr>
+      <p:grpSpPr>
+        <a:xfrm>
+          <a:off x="0" y="0"/>
+          <a:ext cx="0" cy="0"/>
+          <a:chOff x="0" y="0"/>
+          <a:chExt cx="0" cy="0"/>
+        </a:xfrm>
+      </p:grpSpPr>
+      <p:sp>
+        <p:nvSpPr>
+          <p:cNvPr id="2" name="Title 1"/>
+          <p:cNvSpPr>
+            <a:spLocks noGrp="1"/>
+          </p:cNvSpPr>
+          <p:nvPr>
+            <p:ph type="title"/>
+          </p:nvPr>
+        </p:nvSpPr>
+        <p:spPr>
+          <a:xfrm>
+            <a:off x="457200" y="449932"/>
+            <a:ext cx="8286750" cy="1150353"/>
+          </a:xfrm>
+        </p:spPr>
+        <p:txBody>
+          <a:bodyPr/>
+          <a:lstStyle/>
+          <a:p>
+            <a:r>
+              <a:rPr lang="en-CA" dirty="0" smtClean="0">
+                <a:latin typeface="+mn-lt"/>
+              </a:rPr>
+              <a:t>Sampling</a:t>
+            </a:r>
+            <a:endParaRPr lang="en-CA" dirty="0">
+              <a:latin typeface="+mn-lt"/>
+            </a:endParaRPr>
+          </a:p>
+        </p:txBody>
+      </p:sp>
+      <p:sp>
+        <p:nvSpPr>
+          <p:cNvPr id="3" name="Content Placeholder 2"/>
+          <p:cNvSpPr>
+            <a:spLocks noGrp="1"/>
+          </p:cNvSpPr>
+          <p:nvPr>
+            <p:ph idx="1"/>
+          </p:nvPr>
+        </p:nvSpPr>
+        <p:spPr>
+          <a:xfrm>
+            <a:off x="457200" y="1756947"/>
+            <a:ext cx="8286750" cy="3967578"/>
+          </a:xfrm>
+        </p:spPr>
+        <p:txBody>
+          <a:bodyPr>
+            <a:normAutofit/>
+          </a:bodyPr>
+          <a:lstStyle/>
+          <a:p>
+            <a:r>
+              <a:rPr lang="en-CA" dirty="0" smtClean="0">
+                <a:latin typeface="+mn-lt"/>
+              </a:rPr>
+              <a:t>Random sample: Know the probability every individual in the population is in the sample (doesn’t have to be equal)</a:t>
+            </a:r>
+          </a:p>
+          <a:p>
+            <a:r>
+              <a:rPr lang="en-CA" dirty="0" smtClean="0">
+                <a:latin typeface="+mn-lt"/>
+              </a:rPr>
+              <a:t>Empirical Distribution: Based on observed values, i.e., from a simulated experiment</a:t>
+            </a:r>
+          </a:p>
+          <a:p>
+            <a:r>
+              <a:rPr lang="en-CA" dirty="0" smtClean="0">
+                <a:latin typeface="+mn-lt"/>
+              </a:rPr>
+              <a:t>Probability Distribution: Based on theoretical calculations</a:t>
+            </a:r>
+          </a:p>
+          <a:p>
+            <a:r>
+              <a:rPr lang="en-CA" dirty="0" smtClean="0">
+                <a:latin typeface="+mn-lt"/>
+              </a:rPr>
+              <a:t>Law of Large Numbers: Repeating an experiment a large number of times will cause the empirical probability of an event to approach its theoretical probability </a:t>
+            </a:r>
+          </a:p>
+          <a:p>
+            <a:pPr lvl="1"/>
+            <a:r>
+              <a:rPr lang="en-CA" dirty="0" smtClean="0">
+                <a:latin typeface="+mn-lt"/>
+              </a:rPr>
+              <a:t>Example: The more times you flip a coin, the closer the proportion of heads gets to 0.5 (usually)</a:t>
+            </a:r>
+          </a:p>
+          <a:p>
+            <a:endParaRPr lang="en-CA" dirty="0" smtClean="0">
+              <a:latin typeface="+mn-lt"/>
+            </a:endParaRPr>
+          </a:p>
+        </p:txBody>
+      </p:sp>
+    </p:spTree>
+    <p:extLst>
+      <p:ext uri="{BB962C8B-B14F-4D97-AF65-F5344CB8AC3E}">
+        <p14:creationId xmlns:p14="http://schemas.microsoft.com/office/powerpoint/2010/main" val="3099496952"/>
+      </p:ext>
+    </p:extLst>
+  </p:cSld>
+  <p:clrMapOvr>
+    <a:masterClrMapping/>
+  </p:clrMapOvr>
+  <p:timing>
+    <p:tnLst>
+      <p:par>
+        <p:cTn id="1" dur="indefinite" restart="never" nodeType="tmRoot"/>
+      </p:par>
+    </p:tnLst>
+  </p:timing>
+</p:sld>
+</file>
+
+<file path=ppt/slides/slide7.xml><?xml version="1.0" encoding="utf-8"?>
+<p:sld xmlns:a="http://schemas.openxmlformats.org/drawingml/2006/main" xmlns:r="http://schemas.openxmlformats.org/officeDocument/2006/relationships" xmlns:p="http://schemas.openxmlformats.org/presentationml/2006/main">
+  <p:cSld>
+    <p:spTree>
+      <p:nvGrpSpPr>
+        <p:cNvPr id="1" name=""/>
+        <p:cNvGrpSpPr/>
+        <p:nvPr/>
+      </p:nvGrpSpPr>
+      <p:grpSpPr>
+        <a:xfrm>
+          <a:off x="0" y="0"/>
+          <a:ext cx="0" cy="0"/>
+          <a:chOff x="0" y="0"/>
+          <a:chExt cx="0" cy="0"/>
+        </a:xfrm>
+      </p:grpSpPr>
+      <p:sp>
+        <p:nvSpPr>
+          <p:cNvPr id="2" name="Title 1"/>
+          <p:cNvSpPr>
+            <a:spLocks noGrp="1"/>
+          </p:cNvSpPr>
+          <p:nvPr>
+            <p:ph type="title"/>
+          </p:nvPr>
+        </p:nvSpPr>
+        <p:spPr>
+          <a:xfrm>
+            <a:off x="457200" y="449932"/>
+            <a:ext cx="8286750" cy="1150353"/>
+          </a:xfrm>
+        </p:spPr>
+        <p:txBody>
+          <a:bodyPr/>
+          <a:lstStyle/>
+          <a:p>
+            <a:r>
+              <a:rPr lang="en-CA" dirty="0" smtClean="0">
+                <a:latin typeface="+mn-lt"/>
+              </a:rPr>
+              <a:t>Inference</a:t>
+            </a:r>
+            <a:endParaRPr lang="en-CA" dirty="0">
+              <a:latin typeface="+mn-lt"/>
+            </a:endParaRPr>
+          </a:p>
+        </p:txBody>
+      </p:sp>
+      <p:sp>
+        <p:nvSpPr>
+          <p:cNvPr id="3" name="Content Placeholder 2"/>
+          <p:cNvSpPr>
+            <a:spLocks noGrp="1"/>
+          </p:cNvSpPr>
+          <p:nvPr>
+            <p:ph idx="1"/>
+          </p:nvPr>
+        </p:nvSpPr>
+        <p:spPr>
+          <a:xfrm>
+            <a:off x="457200" y="1756947"/>
+            <a:ext cx="8286750" cy="3967578"/>
+          </a:xfrm>
+        </p:spPr>
+        <p:txBody>
+          <a:bodyPr>
+            <a:normAutofit/>
+          </a:bodyPr>
+          <a:lstStyle/>
+          <a:p>
+            <a:r>
+              <a:rPr lang="en-CA" dirty="0" smtClean="0">
+                <a:latin typeface="+mn-lt"/>
+              </a:rPr>
+              <a:t>Extrapolate information about a sample to make conclusions for the population</a:t>
+            </a:r>
+          </a:p>
+          <a:p>
+            <a:r>
+              <a:rPr lang="en-CA" dirty="0" smtClean="0">
+                <a:latin typeface="+mn-lt"/>
+              </a:rPr>
+              <a:t>Population parameter: A metric associated with a population</a:t>
+            </a:r>
+          </a:p>
+          <a:p>
+            <a:r>
+              <a:rPr lang="en-CA" dirty="0">
+                <a:latin typeface="+mn-lt"/>
+              </a:rPr>
+              <a:t>Sample statistic: A metric associated with a sample</a:t>
+            </a:r>
+          </a:p>
+          <a:p>
+            <a:pPr lvl="1"/>
+            <a:r>
+              <a:rPr lang="en-CA" dirty="0" smtClean="0">
+                <a:latin typeface="+mn-lt"/>
+              </a:rPr>
+              <a:t>The theoretical distribution of a statistic can be difficult to determine, so we often approximate it using its empirical distribution</a:t>
+            </a:r>
+          </a:p>
+          <a:p>
+            <a:pPr lvl="1"/>
+            <a:r>
+              <a:rPr lang="en-CA" dirty="0" smtClean="0">
+                <a:latin typeface="+mn-lt"/>
+              </a:rPr>
+              <a:t>Good approximation if the number of samples is large</a:t>
+            </a:r>
+          </a:p>
+        </p:txBody>
+      </p:sp>
+    </p:spTree>
+    <p:extLst>
+      <p:ext uri="{BB962C8B-B14F-4D97-AF65-F5344CB8AC3E}">
+        <p14:creationId xmlns:p14="http://schemas.microsoft.com/office/powerpoint/2010/main" val="3284096425"/>
+      </p:ext>
+    </p:extLst>
+  </p:cSld>
+  <p:clrMapOvr>
+    <a:masterClrMapping/>
+  </p:clrMapOvr>
+  <p:timing>
+    <p:tnLst>
+      <p:par>
+        <p:cTn id="1" dur="indefinite" restart="never" nodeType="tmRoot"/>
+      </p:par>
+    </p:tnLst>
+  </p:timing>
+</p:sld>
+</file>
+
+<file path=ppt/slides/slide8.xml><?xml version="1.0" encoding="utf-8"?>
+<p:sld xmlns:a="http://schemas.openxmlformats.org/drawingml/2006/main" xmlns:r="http://schemas.openxmlformats.org/officeDocument/2006/relationships" xmlns:p="http://schemas.openxmlformats.org/presentationml/2006/main">
+  <p:cSld>
+    <p:spTree>
+      <p:nvGrpSpPr>
+        <p:cNvPr id="1" name=""/>
+        <p:cNvGrpSpPr/>
+        <p:nvPr/>
+      </p:nvGrpSpPr>
+      <p:grpSpPr>
+        <a:xfrm>
+          <a:off x="0" y="0"/>
+          <a:ext cx="0" cy="0"/>
+          <a:chOff x="0" y="0"/>
+          <a:chExt cx="0" cy="0"/>
+        </a:xfrm>
+      </p:grpSpPr>
+      <p:sp>
+        <p:nvSpPr>
+          <p:cNvPr id="2" name="Title 1"/>
+          <p:cNvSpPr>
+            <a:spLocks noGrp="1"/>
+          </p:cNvSpPr>
+          <p:nvPr>
+            <p:ph type="title"/>
+          </p:nvPr>
+        </p:nvSpPr>
+        <p:spPr>
+          <a:xfrm>
+            <a:off x="457200" y="449932"/>
+            <a:ext cx="8286750" cy="1150353"/>
+          </a:xfrm>
+        </p:spPr>
+        <p:txBody>
+          <a:bodyPr/>
+          <a:lstStyle/>
+          <a:p>
+            <a:r>
+              <a:rPr lang="en-CA" dirty="0" smtClean="0">
+                <a:latin typeface="+mn-lt"/>
+              </a:rPr>
+              <a:t>Announcements</a:t>
+            </a:r>
+            <a:endParaRPr lang="en-CA" dirty="0">
+              <a:latin typeface="+mn-lt"/>
+            </a:endParaRPr>
+          </a:p>
+        </p:txBody>
+      </p:sp>
+      <p:sp>
+        <p:nvSpPr>
+          <p:cNvPr id="3" name="Content Placeholder 2"/>
+          <p:cNvSpPr>
+            <a:spLocks noGrp="1"/>
+          </p:cNvSpPr>
+          <p:nvPr>
+            <p:ph idx="1"/>
+          </p:nvPr>
+        </p:nvSpPr>
+        <p:spPr>
+          <a:xfrm>
+            <a:off x="457200" y="1756947"/>
+            <a:ext cx="8286750" cy="3596103"/>
+          </a:xfrm>
+        </p:spPr>
+        <p:txBody>
+          <a:bodyPr/>
+          <a:lstStyle/>
+          <a:p>
             <a:endParaRPr lang="en-CA" dirty="0">
               <a:latin typeface="+mn-lt"/>
             </a:endParaRPr>
@@ -7852,6 +9201,107 @@
     <p:extLst>
       <p:ext uri="{BB962C8B-B14F-4D97-AF65-F5344CB8AC3E}">
         <p14:creationId xmlns:p14="http://schemas.microsoft.com/office/powerpoint/2010/main" val="203414778"/>
+      </p:ext>
+    </p:extLst>
+  </p:cSld>
+  <p:clrMapOvr>
+    <a:masterClrMapping/>
+  </p:clrMapOvr>
+  <p:timing>
+    <p:tnLst>
+      <p:par>
+        <p:cTn id="1" dur="indefinite" restart="never" nodeType="tmRoot"/>
+      </p:par>
+    </p:tnLst>
+  </p:timing>
+</p:sld>
+</file>
+
+<file path=ppt/slides/slide9.xml><?xml version="1.0" encoding="utf-8"?>
+<p:sld xmlns:a="http://schemas.openxmlformats.org/drawingml/2006/main" xmlns:r="http://schemas.openxmlformats.org/officeDocument/2006/relationships" xmlns:p="http://schemas.openxmlformats.org/presentationml/2006/main">
+  <p:cSld>
+    <p:spTree>
+      <p:nvGrpSpPr>
+        <p:cNvPr id="1" name=""/>
+        <p:cNvGrpSpPr/>
+        <p:nvPr/>
+      </p:nvGrpSpPr>
+      <p:grpSpPr>
+        <a:xfrm>
+          <a:off x="0" y="0"/>
+          <a:ext cx="0" cy="0"/>
+          <a:chOff x="0" y="0"/>
+          <a:chExt cx="0" cy="0"/>
+        </a:xfrm>
+      </p:grpSpPr>
+      <p:sp>
+        <p:nvSpPr>
+          <p:cNvPr id="2" name="Title 1"/>
+          <p:cNvSpPr>
+            <a:spLocks noGrp="1"/>
+          </p:cNvSpPr>
+          <p:nvPr>
+            <p:ph type="title"/>
+          </p:nvPr>
+        </p:nvSpPr>
+        <p:spPr>
+          <a:xfrm>
+            <a:off x="457200" y="449932"/>
+            <a:ext cx="8286750" cy="1150353"/>
+          </a:xfrm>
+        </p:spPr>
+        <p:txBody>
+          <a:bodyPr/>
+          <a:lstStyle/>
+          <a:p>
+            <a:r>
+              <a:rPr lang="en-CA" dirty="0" smtClean="0">
+                <a:latin typeface="+mn-lt"/>
+              </a:rPr>
+              <a:t>Lab Notebook</a:t>
+            </a:r>
+            <a:endParaRPr lang="en-CA" dirty="0">
+              <a:latin typeface="+mn-lt"/>
+            </a:endParaRPr>
+          </a:p>
+        </p:txBody>
+      </p:sp>
+      <p:sp>
+        <p:nvSpPr>
+          <p:cNvPr id="3" name="Content Placeholder 2"/>
+          <p:cNvSpPr>
+            <a:spLocks noGrp="1"/>
+          </p:cNvSpPr>
+          <p:nvPr>
+            <p:ph idx="1"/>
+          </p:nvPr>
+        </p:nvSpPr>
+        <p:spPr>
+          <a:xfrm>
+            <a:off x="457200" y="1756947"/>
+            <a:ext cx="8286750" cy="3596103"/>
+          </a:xfrm>
+        </p:spPr>
+        <p:txBody>
+          <a:bodyPr/>
+          <a:lstStyle/>
+          <a:p>
+            <a:pPr marL="0" indent="0">
+              <a:buNone/>
+            </a:pPr>
+            <a:r>
+              <a:rPr lang="en-CA" smtClean="0">
+                <a:latin typeface="Avenir LT Std 45 Book" pitchFamily="34" charset="0"/>
+              </a:rPr>
+              <a:t>TBD</a:t>
+            </a:r>
+          </a:p>
+        </p:txBody>
+      </p:sp>
+    </p:spTree>
+    <p:extLst>
+      <p:ext uri="{BB962C8B-B14F-4D97-AF65-F5344CB8AC3E}">
+        <p14:creationId xmlns:p14="http://schemas.microsoft.com/office/powerpoint/2010/main" val="687167673"/>
       </p:ext>
     </p:extLst>
   </p:cSld>

</xml_diff>